<commit_message>
slight tweaks to answer
</commit_message>
<xml_diff>
--- a/HermioneBot.pptx
+++ b/HermioneBot.pptx
@@ -6,14 +6,15 @@
   </p:sldMasterIdLst>
   <p:sldIdLst>
     <p:sldId id="256" r:id="rId2"/>
-    <p:sldId id="257" r:id="rId3"/>
-    <p:sldId id="258" r:id="rId4"/>
-    <p:sldId id="260" r:id="rId5"/>
-    <p:sldId id="261" r:id="rId6"/>
-    <p:sldId id="262" r:id="rId7"/>
-    <p:sldId id="259" r:id="rId8"/>
-    <p:sldId id="263" r:id="rId9"/>
-    <p:sldId id="264" r:id="rId10"/>
+    <p:sldId id="267" r:id="rId3"/>
+    <p:sldId id="257" r:id="rId4"/>
+    <p:sldId id="258" r:id="rId5"/>
+    <p:sldId id="260" r:id="rId6"/>
+    <p:sldId id="261" r:id="rId7"/>
+    <p:sldId id="266" r:id="rId8"/>
+    <p:sldId id="265" r:id="rId9"/>
+    <p:sldId id="263" r:id="rId10"/>
+    <p:sldId id="264" r:id="rId11"/>
   </p:sldIdLst>
   <p:sldSz cx="9144000" cy="6858000" type="screen4x3"/>
   <p:notesSz cx="6858000" cy="9144000"/>
@@ -301,7 +302,7 @@
             <a:fld id="{8E36636D-D922-432D-A958-524484B5923D}" type="datetimeFigureOut">
               <a:rPr lang="en-US" smtClean="0"/>
               <a:pPr/>
-              <a:t>2015-04-04</a:t>
+              <a:t>2015-04-08</a:t>
             </a:fld>
             <a:endParaRPr lang="en-US"/>
           </a:p>
@@ -468,7 +469,7 @@
             <a:fld id="{8E36636D-D922-432D-A958-524484B5923D}" type="datetimeFigureOut">
               <a:rPr lang="en-US" smtClean="0"/>
               <a:pPr/>
-              <a:t>2015-04-04</a:t>
+              <a:t>2015-04-08</a:t>
             </a:fld>
             <a:endParaRPr lang="en-US"/>
           </a:p>
@@ -645,7 +646,7 @@
             <a:fld id="{8E36636D-D922-432D-A958-524484B5923D}" type="datetimeFigureOut">
               <a:rPr lang="en-US" smtClean="0"/>
               <a:pPr/>
-              <a:t>2015-04-04</a:t>
+              <a:t>2015-04-08</a:t>
             </a:fld>
             <a:endParaRPr lang="en-US"/>
           </a:p>
@@ -812,7 +813,7 @@
             <a:fld id="{8E36636D-D922-432D-A958-524484B5923D}" type="datetimeFigureOut">
               <a:rPr lang="en-US" smtClean="0"/>
               <a:pPr/>
-              <a:t>2015-04-04</a:t>
+              <a:t>2015-04-08</a:t>
             </a:fld>
             <a:endParaRPr lang="en-US"/>
           </a:p>
@@ -1053,7 +1054,7 @@
             <a:fld id="{8E36636D-D922-432D-A958-524484B5923D}" type="datetimeFigureOut">
               <a:rPr lang="en-US" smtClean="0"/>
               <a:pPr/>
-              <a:t>2015-04-04</a:t>
+              <a:t>2015-04-08</a:t>
             </a:fld>
             <a:endParaRPr lang="en-US"/>
           </a:p>
@@ -1338,7 +1339,7 @@
             <a:fld id="{8E36636D-D922-432D-A958-524484B5923D}" type="datetimeFigureOut">
               <a:rPr lang="en-US" smtClean="0"/>
               <a:pPr/>
-              <a:t>2015-04-04</a:t>
+              <a:t>2015-04-08</a:t>
             </a:fld>
             <a:endParaRPr lang="en-US"/>
           </a:p>
@@ -1757,7 +1758,7 @@
             <a:fld id="{8E36636D-D922-432D-A958-524484B5923D}" type="datetimeFigureOut">
               <a:rPr lang="en-US" smtClean="0"/>
               <a:pPr/>
-              <a:t>2015-04-04</a:t>
+              <a:t>2015-04-08</a:t>
             </a:fld>
             <a:endParaRPr lang="en-US"/>
           </a:p>
@@ -1872,7 +1873,7 @@
             <a:fld id="{8E36636D-D922-432D-A958-524484B5923D}" type="datetimeFigureOut">
               <a:rPr lang="en-US" smtClean="0"/>
               <a:pPr/>
-              <a:t>2015-04-04</a:t>
+              <a:t>2015-04-08</a:t>
             </a:fld>
             <a:endParaRPr lang="en-US"/>
           </a:p>
@@ -1964,7 +1965,7 @@
             <a:fld id="{8E36636D-D922-432D-A958-524484B5923D}" type="datetimeFigureOut">
               <a:rPr lang="en-US" smtClean="0"/>
               <a:pPr/>
-              <a:t>2015-04-04</a:t>
+              <a:t>2015-04-08</a:t>
             </a:fld>
             <a:endParaRPr lang="en-US"/>
           </a:p>
@@ -2245,7 +2246,7 @@
             <a:fld id="{8E36636D-D922-432D-A958-524484B5923D}" type="datetimeFigureOut">
               <a:rPr lang="en-US" smtClean="0"/>
               <a:pPr/>
-              <a:t>2015-04-04</a:t>
+              <a:t>2015-04-08</a:t>
             </a:fld>
             <a:endParaRPr lang="en-US"/>
           </a:p>
@@ -2506,7 +2507,7 @@
             <a:fld id="{8E36636D-D922-432D-A958-524484B5923D}" type="datetimeFigureOut">
               <a:rPr lang="en-US" smtClean="0"/>
               <a:pPr/>
-              <a:t>2015-04-04</a:t>
+              <a:t>2015-04-08</a:t>
             </a:fld>
             <a:endParaRPr lang="en-US"/>
           </a:p>
@@ -2716,7 +2717,7 @@
             <a:fld id="{8E36636D-D922-432D-A958-524484B5923D}" type="datetimeFigureOut">
               <a:rPr lang="en-US" smtClean="0"/>
               <a:pPr/>
-              <a:t>2015-04-04</a:t>
+              <a:t>2015-04-08</a:t>
             </a:fld>
             <a:endParaRPr lang="en-US"/>
           </a:p>
@@ -3279,6 +3280,66 @@
 </p:sld>
 </file>
 
+<file path=ppt/slides/slide10.xml><?xml version="1.0" encoding="utf-8"?>
+<p:sld xmlns:a="http://schemas.openxmlformats.org/drawingml/2006/main" xmlns:r="http://schemas.openxmlformats.org/officeDocument/2006/relationships" xmlns:p="http://schemas.openxmlformats.org/presentationml/2006/main">
+  <p:cSld>
+    <p:spTree>
+      <p:nvGrpSpPr>
+        <p:cNvPr id="1" name=""/>
+        <p:cNvGrpSpPr/>
+        <p:nvPr/>
+      </p:nvGrpSpPr>
+      <p:grpSpPr>
+        <a:xfrm>
+          <a:off x="0" y="0"/>
+          <a:ext cx="0" cy="0"/>
+          <a:chOff x="0" y="0"/>
+          <a:chExt cx="0" cy="0"/>
+        </a:xfrm>
+      </p:grpSpPr>
+      <p:sp>
+        <p:nvSpPr>
+          <p:cNvPr id="6" name="Title 5"/>
+          <p:cNvSpPr>
+            <a:spLocks noGrp="1"/>
+          </p:cNvSpPr>
+          <p:nvPr>
+            <p:ph type="title"/>
+          </p:nvPr>
+        </p:nvSpPr>
+        <p:spPr>
+          <a:xfrm>
+            <a:off x="457200" y="2626365"/>
+            <a:ext cx="8229600" cy="1143000"/>
+          </a:xfrm>
+        </p:spPr>
+        <p:txBody>
+          <a:bodyPr>
+            <a:noAutofit/>
+          </a:bodyPr>
+          <a:lstStyle/>
+          <a:p>
+            <a:r>
+              <a:rPr lang="en-US" sz="8000" dirty="0" smtClean="0"/>
+              <a:t>Demo!</a:t>
+            </a:r>
+            <a:endParaRPr lang="en-US" sz="8000" dirty="0"/>
+          </a:p>
+        </p:txBody>
+      </p:sp>
+    </p:spTree>
+    <p:extLst>
+      <p:ext uri="{BB962C8B-B14F-4D97-AF65-F5344CB8AC3E}">
+        <p14:creationId xmlns:p14="http://schemas.microsoft.com/office/powerpoint/2010/main" val="3080268509"/>
+      </p:ext>
+    </p:extLst>
+  </p:cSld>
+  <p:clrMapOvr>
+    <a:masterClrMapping/>
+  </p:clrMapOvr>
+</p:sld>
+</file>
+
 <file path=ppt/slides/slide2.xml><?xml version="1.0" encoding="utf-8"?>
 <p:sld xmlns:a="http://schemas.openxmlformats.org/drawingml/2006/main" xmlns:r="http://schemas.openxmlformats.org/officeDocument/2006/relationships" xmlns:p="http://schemas.openxmlformats.org/presentationml/2006/main">
   <p:cSld>
@@ -3296,9 +3357,33 @@
           <a:chExt cx="0" cy="0"/>
         </a:xfrm>
       </p:grpSpPr>
-      <p:sp>
-        <p:nvSpPr>
-          <p:cNvPr id="2" name="Title 1"/>
+      <p:pic>
+        <p:nvPicPr>
+          <p:cNvPr id="4" name="Picture 3"/>
+          <p:cNvPicPr>
+            <a:picLocks noChangeAspect="1"/>
+          </p:cNvPicPr>
+          <p:nvPr/>
+        </p:nvPicPr>
+        <p:blipFill>
+          <a:blip r:embed="rId2"/>
+          <a:stretch>
+            <a:fillRect/>
+          </a:stretch>
+        </p:blipFill>
+        <p:spPr>
+          <a:xfrm>
+            <a:off x="2963303" y="1924466"/>
+            <a:ext cx="3253956" cy="4006433"/>
+          </a:xfrm>
+          <a:prstGeom prst="rect">
+            <a:avLst/>
+          </a:prstGeom>
+        </p:spPr>
+      </p:pic>
+      <p:sp>
+        <p:nvSpPr>
+          <p:cNvPr id="5" name="Title 4"/>
           <p:cNvSpPr>
             <a:spLocks noGrp="1"/>
           </p:cNvSpPr>
@@ -3312,72 +3397,8 @@
           <a:lstStyle/>
           <a:p>
             <a:r>
-              <a:rPr lang="en-US" dirty="0" err="1" smtClean="0"/>
-              <a:t>Wikia</a:t>
-            </a:r>
-            <a:r>
-              <a:rPr lang="en-US" dirty="0" smtClean="0"/>
-              <a:t> API</a:t>
-            </a:r>
-            <a:endParaRPr lang="en-US" dirty="0"/>
-          </a:p>
-        </p:txBody>
-      </p:sp>
-      <p:sp>
-        <p:nvSpPr>
-          <p:cNvPr id="3" name="Content Placeholder 2"/>
-          <p:cNvSpPr>
-            <a:spLocks noGrp="1"/>
-          </p:cNvSpPr>
-          <p:nvPr>
-            <p:ph idx="1"/>
-          </p:nvPr>
-        </p:nvSpPr>
-        <p:spPr/>
-        <p:txBody>
-          <a:bodyPr/>
-          <a:lstStyle/>
-          <a:p>
-            <a:r>
-              <a:rPr lang="en-US" dirty="0" smtClean="0"/>
-              <a:t>An API used to grab the content of articles on the Harry Potter wiki as </a:t>
-            </a:r>
-            <a:r>
-              <a:rPr lang="en-US" dirty="0" err="1" smtClean="0"/>
-              <a:t>json</a:t>
-            </a:r>
-            <a:r>
-              <a:rPr lang="en-US" dirty="0" smtClean="0"/>
-              <a:t> </a:t>
-            </a:r>
-          </a:p>
-          <a:p>
-            <a:r>
-              <a:rPr lang="en-US" dirty="0" err="1" smtClean="0"/>
-              <a:t>url</a:t>
-            </a:r>
-            <a:r>
-              <a:rPr lang="en-US" dirty="0"/>
-              <a:t>: </a:t>
-            </a:r>
-            <a:r>
-              <a:rPr lang="en-US" dirty="0">
-                <a:hlinkClick r:id="rId2"/>
-              </a:rPr>
-              <a:t>http://www.harrypotter.wikia.com/api/</a:t>
-            </a:r>
-            <a:r>
-              <a:rPr lang="en-US" dirty="0" smtClean="0">
-                <a:hlinkClick r:id="rId2"/>
-              </a:rPr>
-              <a:t>v1</a:t>
-            </a:r>
-            <a:endParaRPr lang="en-US" dirty="0" smtClean="0"/>
-          </a:p>
-          <a:p>
-            <a:r>
-              <a:rPr lang="en-US" dirty="0" smtClean="0"/>
-              <a:t>Used various encoded URI fragments to search and retrieve article content</a:t>
+              <a:rPr lang="en-US" dirty="0" smtClean="0"/>
+              <a:t>Motivation &amp; Brief History</a:t>
             </a:r>
             <a:endParaRPr lang="en-US" dirty="0"/>
           </a:p>
@@ -3386,20 +3407,13 @@
     </p:spTree>
     <p:extLst>
       <p:ext uri="{BB962C8B-B14F-4D97-AF65-F5344CB8AC3E}">
-        <p14:creationId xmlns:p14="http://schemas.microsoft.com/office/powerpoint/2010/main" val="913538593"/>
+        <p14:creationId xmlns:p14="http://schemas.microsoft.com/office/powerpoint/2010/main" val="1680771842"/>
       </p:ext>
     </p:extLst>
   </p:cSld>
   <p:clrMapOvr>
     <a:masterClrMapping/>
   </p:clrMapOvr>
-  <p:timing>
-    <p:tnLst>
-      <p:par>
-        <p:cTn xmlns:p14="http://schemas.microsoft.com/office/powerpoint/2010/main" id="1" dur="indefinite" restart="never" nodeType="tmRoot"/>
-      </p:par>
-    </p:tnLst>
-  </p:timing>
 </p:sld>
 </file>
 
@@ -3422,7 +3436,7 @@
       </p:grpSpPr>
       <p:sp>
         <p:nvSpPr>
-          <p:cNvPr id="7" name="Title 6"/>
+          <p:cNvPr id="2" name="Title 1"/>
           <p:cNvSpPr>
             <a:spLocks noGrp="1"/>
           </p:cNvSpPr>
@@ -3436,8 +3450,12 @@
           <a:lstStyle/>
           <a:p>
             <a:r>
-              <a:rPr lang="en-US" dirty="0" smtClean="0"/>
-              <a:t>Understanding Queries</a:t>
+              <a:rPr lang="en-US" dirty="0" err="1" smtClean="0"/>
+              <a:t>Wikia</a:t>
+            </a:r>
+            <a:r>
+              <a:rPr lang="en-US" dirty="0" smtClean="0"/>
+              <a:t> API</a:t>
             </a:r>
             <a:endParaRPr lang="en-US" dirty="0"/>
           </a:p>
@@ -3445,7 +3463,7 @@
       </p:sp>
       <p:sp>
         <p:nvSpPr>
-          <p:cNvPr id="8" name="Content Placeholder 7"/>
+          <p:cNvPr id="3" name="Content Placeholder 2"/>
           <p:cNvSpPr>
             <a:spLocks noGrp="1"/>
           </p:cNvSpPr>
@@ -3455,98 +3473,58 @@
         </p:nvSpPr>
         <p:spPr/>
         <p:txBody>
-          <a:bodyPr>
-            <a:normAutofit/>
-          </a:bodyPr>
-          <a:lstStyle/>
-          <a:p>
-            <a:r>
-              <a:rPr lang="en-US" dirty="0" smtClean="0"/>
-              <a:t>Tokenized input using </a:t>
+          <a:bodyPr/>
+          <a:lstStyle/>
+          <a:p>
+            <a:r>
+              <a:rPr lang="en-US" dirty="0" smtClean="0"/>
+              <a:t>An API used to grab the content of articles on the Harry Potter wiki as </a:t>
             </a:r>
             <a:r>
               <a:rPr lang="en-US" dirty="0" err="1" smtClean="0"/>
-              <a:t>nltk’s</a:t>
+              <a:t>json</a:t>
             </a:r>
             <a:r>
               <a:rPr lang="en-US" dirty="0" smtClean="0"/>
               <a:t> </a:t>
             </a:r>
+          </a:p>
+          <a:p>
             <a:r>
               <a:rPr lang="en-US" dirty="0" err="1" smtClean="0"/>
-              <a:t>Punkt</a:t>
-            </a:r>
-            <a:r>
-              <a:rPr lang="en-US" dirty="0" smtClean="0"/>
-              <a:t> </a:t>
-            </a:r>
-            <a:r>
-              <a:rPr lang="en-US" dirty="0" err="1" smtClean="0"/>
-              <a:t>Tokenizer</a:t>
-            </a:r>
-            <a:r>
-              <a:rPr lang="en-US" dirty="0" smtClean="0"/>
-              <a:t> Models and </a:t>
-            </a:r>
-            <a:r>
-              <a:rPr lang="en-US" dirty="0" err="1" smtClean="0"/>
-              <a:t>word_tokenize</a:t>
-            </a:r>
-            <a:r>
-              <a:rPr lang="en-US" dirty="0" smtClean="0"/>
-              <a:t>(</a:t>
-            </a:r>
-            <a:r>
-              <a:rPr lang="en-US" i="1" dirty="0" err="1" smtClean="0"/>
-              <a:t>userInput</a:t>
-            </a:r>
-            <a:r>
-              <a:rPr lang="en-US" dirty="0" smtClean="0"/>
-              <a:t>)</a:t>
-            </a:r>
-          </a:p>
-          <a:p>
-            <a:pPr lvl="1"/>
-            <a:r>
-              <a:rPr lang="en-US" b="1" dirty="0" smtClean="0"/>
-              <a:t>Example</a:t>
-            </a:r>
-            <a:r>
-              <a:rPr lang="en-US" dirty="0" smtClean="0"/>
-              <a:t>:</a:t>
-            </a:r>
-          </a:p>
-          <a:p>
-            <a:pPr marL="457200" lvl="1" indent="0">
-              <a:buNone/>
-            </a:pPr>
-            <a:r>
-              <a:rPr lang="en-US" dirty="0" smtClean="0"/>
-              <a:t>‘What is </a:t>
-            </a:r>
-            <a:r>
-              <a:rPr lang="en-US" dirty="0" err="1" smtClean="0"/>
-              <a:t>Quidditch</a:t>
-            </a:r>
-            <a:r>
-              <a:rPr lang="en-US" dirty="0" smtClean="0"/>
-              <a:t>?’ -&gt; [‘What’, ‘is’, ‘</a:t>
-            </a:r>
-            <a:r>
-              <a:rPr lang="en-US" dirty="0" err="1" smtClean="0"/>
-              <a:t>Quidditch</a:t>
-            </a:r>
-            <a:r>
-              <a:rPr lang="en-US" dirty="0" smtClean="0"/>
-              <a:t>’]</a:t>
-            </a:r>
+              <a:t>url</a:t>
+            </a:r>
+            <a:r>
+              <a:rPr lang="en-US" dirty="0"/>
+              <a:t>: </a:t>
+            </a:r>
+            <a:r>
+              <a:rPr lang="en-US" dirty="0">
+                <a:hlinkClick r:id="rId2"/>
+              </a:rPr>
+              <a:t>http://www.harrypotter.wikia.com/api/</a:t>
+            </a:r>
+            <a:r>
+              <a:rPr lang="en-US" dirty="0" smtClean="0">
+                <a:hlinkClick r:id="rId2"/>
+              </a:rPr>
+              <a:t>v1</a:t>
+            </a:r>
+            <a:endParaRPr lang="en-US" dirty="0" smtClean="0"/>
+          </a:p>
+          <a:p>
+            <a:r>
+              <a:rPr lang="en-US" dirty="0" smtClean="0"/>
+              <a:t>Used various encoded URI fragments to search and retrieve article content</a:t>
+            </a:r>
+            <a:endParaRPr lang="en-US" dirty="0"/>
           </a:p>
         </p:txBody>
       </p:sp>
     </p:spTree>
     <p:extLst>
       <p:ext uri="{BB962C8B-B14F-4D97-AF65-F5344CB8AC3E}">
-        <p14:creationId xmlns:p14="http://schemas.microsoft.com/office/powerpoint/2010/main" val="1201367962"/>
+        <p14:creationId xmlns:p14="http://schemas.microsoft.com/office/powerpoint/2010/main" val="913538593"/>
       </p:ext>
     </p:extLst>
   </p:cSld>
@@ -3621,23 +3599,47 @@
           <a:lstStyle/>
           <a:p>
             <a:r>
-              <a:rPr lang="en-US" sz="2800" dirty="0" smtClean="0"/>
-              <a:t>Performed POS-tagging on the query using Treebank POS Tagger and </a:t>
-            </a:r>
-            <a:r>
-              <a:rPr lang="en-US" sz="2800" dirty="0" err="1" smtClean="0"/>
-              <a:t>pos_tag</a:t>
-            </a:r>
-            <a:r>
-              <a:rPr lang="en-US" sz="2800" dirty="0" smtClean="0"/>
+              <a:rPr lang="en-US" dirty="0" smtClean="0"/>
+              <a:t>Tokenized input using </a:t>
+            </a:r>
+            <a:r>
+              <a:rPr lang="en-US" dirty="0" err="1" smtClean="0"/>
+              <a:t>nltk’s</a:t>
+            </a:r>
+            <a:r>
+              <a:rPr lang="en-US" dirty="0" smtClean="0"/>
+              <a:t> </a:t>
+            </a:r>
+            <a:r>
+              <a:rPr lang="en-US" dirty="0" err="1" smtClean="0"/>
+              <a:t>Punkt</a:t>
+            </a:r>
+            <a:r>
+              <a:rPr lang="en-US" dirty="0" smtClean="0"/>
+              <a:t> </a:t>
+            </a:r>
+            <a:r>
+              <a:rPr lang="en-US" dirty="0" err="1" smtClean="0"/>
+              <a:t>Tokenizer</a:t>
+            </a:r>
+            <a:r>
+              <a:rPr lang="en-US" dirty="0" smtClean="0"/>
+              <a:t> Models and </a:t>
+            </a:r>
+            <a:r>
+              <a:rPr lang="en-US" dirty="0" err="1" smtClean="0"/>
+              <a:t>word_tokenize</a:t>
+            </a:r>
+            <a:r>
+              <a:rPr lang="en-US" dirty="0" smtClean="0"/>
               <a:t>(</a:t>
             </a:r>
             <a:r>
-              <a:rPr lang="en-US" sz="2800" i="1" dirty="0" err="1" smtClean="0"/>
-              <a:t>tokenizedInput</a:t>
-            </a:r>
-            <a:r>
-              <a:rPr lang="en-US" sz="2800" dirty="0" smtClean="0"/>
+              <a:rPr lang="en-US" i="1" dirty="0" err="1" smtClean="0"/>
+              <a:t>userInput</a:t>
+            </a:r>
+            <a:r>
+              <a:rPr lang="en-US" dirty="0" smtClean="0"/>
               <a:t>)</a:t>
             </a:r>
           </a:p>
@@ -3649,7 +3651,16 @@
             </a:r>
             <a:r>
               <a:rPr lang="en-US" dirty="0" smtClean="0"/>
-              <a:t>:  [‘What’, ‘is’, ‘</a:t>
+              <a:t>:</a:t>
+            </a:r>
+          </a:p>
+          <a:p>
+            <a:pPr marL="457200" lvl="1" indent="0">
+              <a:buNone/>
+            </a:pPr>
+            <a:r>
+              <a:rPr lang="en-US" dirty="0" smtClean="0"/>
+              <a:t>‘What is </a:t>
             </a:r>
             <a:r>
               <a:rPr lang="en-US" dirty="0" err="1" smtClean="0"/>
@@ -3657,16 +3668,7 @@
             </a:r>
             <a:r>
               <a:rPr lang="en-US" dirty="0" smtClean="0"/>
-              <a:t>’] -&gt; </a:t>
-            </a:r>
-          </a:p>
-          <a:p>
-            <a:pPr marL="457200" lvl="1" indent="0">
-              <a:buNone/>
-            </a:pPr>
-            <a:r>
-              <a:rPr lang="en-US" dirty="0" smtClean="0"/>
-              <a:t>[(‘What’, ‘WP’), (‘is’, ‘VBZ’,), (‘</a:t>
+              <a:t>?’ -&gt; [‘What’, ‘is’, ‘</a:t>
             </a:r>
             <a:r>
               <a:rPr lang="en-US" dirty="0" err="1" smtClean="0"/>
@@ -3674,7 +3676,7 @@
             </a:r>
             <a:r>
               <a:rPr lang="en-US" dirty="0" smtClean="0"/>
-              <a:t>, ‘NNP’)]</a:t>
+              <a:t>’]</a:t>
             </a:r>
           </a:p>
         </p:txBody>
@@ -3682,7 +3684,7 @@
     </p:spTree>
     <p:extLst>
       <p:ext uri="{BB962C8B-B14F-4D97-AF65-F5344CB8AC3E}">
-        <p14:creationId xmlns:p14="http://schemas.microsoft.com/office/powerpoint/2010/main" val="2583819871"/>
+        <p14:creationId xmlns:p14="http://schemas.microsoft.com/office/powerpoint/2010/main" val="1201367962"/>
       </p:ext>
     </p:extLst>
   </p:cSld>
@@ -3752,122 +3754,73 @@
         <p:spPr/>
         <p:txBody>
           <a:bodyPr>
-            <a:normAutofit fontScale="92500" lnSpcReduction="20000"/>
+            <a:normAutofit/>
           </a:bodyPr>
           <a:lstStyle/>
           <a:p>
             <a:r>
-              <a:rPr lang="en-US" dirty="0" smtClean="0"/>
-              <a:t>Analyzed sentence structure using a regex parser generated using a specified grammar for NP-chunking</a:t>
+              <a:rPr lang="en-US" sz="2800" dirty="0" smtClean="0"/>
+              <a:t>Performed POS-tagging on the query using Treebank POS Tagger and </a:t>
+            </a:r>
+            <a:r>
+              <a:rPr lang="en-US" sz="2800" dirty="0" err="1" smtClean="0"/>
+              <a:t>pos_tag</a:t>
+            </a:r>
+            <a:r>
+              <a:rPr lang="en-US" sz="2800" dirty="0" smtClean="0"/>
+              <a:t>(</a:t>
+            </a:r>
+            <a:r>
+              <a:rPr lang="en-US" sz="2800" i="1" dirty="0" err="1" smtClean="0"/>
+              <a:t>tokenizedInput</a:t>
+            </a:r>
+            <a:r>
+              <a:rPr lang="en-US" sz="2800" dirty="0" smtClean="0"/>
+              <a:t>)</a:t>
             </a:r>
           </a:p>
           <a:p>
             <a:pPr lvl="1"/>
             <a:r>
-              <a:rPr lang="en-US" dirty="0" smtClean="0"/>
-              <a:t>grammar = </a:t>
+              <a:rPr lang="en-US" b="1" dirty="0" smtClean="0"/>
+              <a:t>Example</a:t>
+            </a:r>
+            <a:r>
+              <a:rPr lang="en-US" dirty="0" smtClean="0"/>
+              <a:t>:  [‘What’, ‘is’, ‘</a:t>
             </a:r>
             <a:r>
               <a:rPr lang="en-US" dirty="0" err="1" smtClean="0"/>
-              <a:t>nltk.data.load</a:t>
-            </a:r>
-            <a:r>
-              <a:rPr lang="en-US" dirty="0" smtClean="0"/>
-              <a:t>(‘</a:t>
+              <a:t>Quidditch</a:t>
+            </a:r>
+            <a:r>
+              <a:rPr lang="en-US" dirty="0" smtClean="0"/>
+              <a:t>’] -&gt; </a:t>
+            </a:r>
+          </a:p>
+          <a:p>
+            <a:pPr marL="457200" lvl="1" indent="0">
+              <a:buNone/>
+            </a:pPr>
+            <a:r>
+              <a:rPr lang="en-US" dirty="0" smtClean="0"/>
+              <a:t>[(‘What’, ‘WP’), (‘is’, ‘VBZ’,), (‘</a:t>
             </a:r>
             <a:r>
               <a:rPr lang="en-US" dirty="0" err="1" smtClean="0"/>
-              <a:t>file:hp.cfg</a:t>
-            </a:r>
-            <a:r>
-              <a:rPr lang="en-US" dirty="0" smtClean="0"/>
-              <a:t>’)</a:t>
-            </a:r>
-          </a:p>
-          <a:p>
-            <a:pPr lvl="1"/>
-            <a:r>
-              <a:rPr lang="en-US" dirty="0" smtClean="0"/>
-              <a:t>parser = </a:t>
-            </a:r>
-            <a:r>
-              <a:rPr lang="en-US" dirty="0" err="1" smtClean="0"/>
-              <a:t>RegExpParser</a:t>
-            </a:r>
-            <a:r>
-              <a:rPr lang="en-US" dirty="0" smtClean="0"/>
-              <a:t>(</a:t>
-            </a:r>
-            <a:r>
-              <a:rPr lang="en-US" i="1" dirty="0" smtClean="0"/>
-              <a:t>grammar</a:t>
-            </a:r>
-            <a:r>
-              <a:rPr lang="en-US" dirty="0" smtClean="0"/>
-              <a:t>)</a:t>
-            </a:r>
-          </a:p>
-          <a:p>
-            <a:r>
-              <a:rPr lang="en-US" dirty="0" smtClean="0"/>
-              <a:t> Parsed query:</a:t>
-            </a:r>
-          </a:p>
-          <a:p>
-            <a:pPr lvl="1"/>
-            <a:r>
-              <a:rPr lang="en-US" dirty="0" err="1" smtClean="0"/>
-              <a:t>parser.parse</a:t>
-            </a:r>
-            <a:r>
-              <a:rPr lang="en-US" dirty="0" smtClean="0"/>
-              <a:t>(</a:t>
-            </a:r>
-            <a:r>
-              <a:rPr lang="en-US" i="1" dirty="0" err="1" smtClean="0"/>
-              <a:t>taggedInput</a:t>
-            </a:r>
-            <a:r>
-              <a:rPr lang="en-US" dirty="0" smtClean="0"/>
-              <a:t>) </a:t>
-            </a:r>
-          </a:p>
-          <a:p>
-            <a:pPr marL="457200" lvl="1" indent="0">
-              <a:buNone/>
-            </a:pPr>
-            <a:endParaRPr lang="en-US" dirty="0"/>
-          </a:p>
-        </p:txBody>
-      </p:sp>
-      <p:pic>
-        <p:nvPicPr>
-          <p:cNvPr id="2" name="Picture 1"/>
-          <p:cNvPicPr>
-            <a:picLocks noChangeAspect="1"/>
-          </p:cNvPicPr>
-          <p:nvPr/>
-        </p:nvPicPr>
-        <p:blipFill>
-          <a:blip r:embed="rId2"/>
-          <a:stretch>
-            <a:fillRect/>
-          </a:stretch>
-        </p:blipFill>
-        <p:spPr>
-          <a:xfrm>
-            <a:off x="5555848" y="4431065"/>
-            <a:ext cx="2243927" cy="2031814"/>
-          </a:xfrm>
-          <a:prstGeom prst="rect">
-            <a:avLst/>
-          </a:prstGeom>
-        </p:spPr>
-      </p:pic>
+              <a:t>Quidditch</a:t>
+            </a:r>
+            <a:r>
+              <a:rPr lang="en-US" dirty="0" smtClean="0"/>
+              <a:t>, ‘NNP’)]</a:t>
+            </a:r>
+          </a:p>
+        </p:txBody>
+      </p:sp>
     </p:spTree>
     <p:extLst>
       <p:ext uri="{BB962C8B-B14F-4D97-AF65-F5344CB8AC3E}">
-        <p14:creationId xmlns:p14="http://schemas.microsoft.com/office/powerpoint/2010/main" val="3825050236"/>
+        <p14:creationId xmlns:p14="http://schemas.microsoft.com/office/powerpoint/2010/main" val="2583819871"/>
       </p:ext>
     </p:extLst>
   </p:cSld>
@@ -3937,112 +3890,161 @@
         <p:spPr/>
         <p:txBody>
           <a:bodyPr>
-            <a:normAutofit fontScale="77500" lnSpcReduction="20000"/>
+            <a:normAutofit fontScale="85000" lnSpcReduction="20000"/>
           </a:bodyPr>
           <a:lstStyle/>
           <a:p>
             <a:r>
               <a:rPr lang="en-US" dirty="0" smtClean="0"/>
-              <a:t>Strategy: Choose a subset of questions to handle based on sentence structure:</a:t>
+              <a:t>Analyzed sentence structure using a regex parser generated using a specified grammar for </a:t>
+            </a:r>
+            <a:r>
+              <a:rPr lang="en-US" dirty="0" smtClean="0"/>
+              <a:t>NP/VP/PP-</a:t>
+            </a:r>
+            <a:r>
+              <a:rPr lang="en-US" dirty="0" smtClean="0"/>
+              <a:t>chunking</a:t>
             </a:r>
           </a:p>
           <a:p>
             <a:pPr lvl="1"/>
             <a:r>
               <a:rPr lang="en-US" dirty="0" smtClean="0"/>
-              <a:t>&lt;WH-NP&gt; &lt;Aux&gt; &lt;NP&gt;</a:t>
+              <a:t>Subset of rules for NP-chunking:</a:t>
             </a:r>
           </a:p>
           <a:p>
             <a:pPr lvl="2"/>
             <a:r>
               <a:rPr lang="en-US" dirty="0" smtClean="0"/>
-              <a:t>Who was </a:t>
+              <a:t>grammar </a:t>
+            </a:r>
+            <a:r>
+              <a:rPr lang="en-US" dirty="0" smtClean="0"/>
+              <a:t>= </a:t>
+            </a:r>
+            <a:r>
+              <a:rPr lang="en-US" dirty="0" smtClean="0"/>
+              <a:t>“NP</a:t>
+            </a:r>
+            <a:r>
+              <a:rPr lang="en-US" dirty="0"/>
+              <a:t>: {&lt;</a:t>
+            </a:r>
+            <a:r>
+              <a:rPr lang="en-US" dirty="0" smtClean="0"/>
+              <a:t>DT&gt;</a:t>
+            </a:r>
+            <a:r>
+              <a:rPr lang="en-US" dirty="0"/>
+              <a:t>?&lt;</a:t>
+            </a:r>
+            <a:r>
+              <a:rPr lang="en-US" dirty="0" smtClean="0"/>
+              <a:t>JJ&gt;</a:t>
+            </a:r>
+            <a:r>
+              <a:rPr lang="en-US" dirty="0"/>
+              <a:t>*&lt;NN|NNS&gt;</a:t>
+            </a:r>
+            <a:r>
+              <a:rPr lang="en-US" dirty="0" smtClean="0"/>
+              <a:t>+}</a:t>
+            </a:r>
+            <a:r>
+              <a:rPr lang="en-US" dirty="0" smtClean="0"/>
+              <a:t>”</a:t>
+            </a:r>
+          </a:p>
+          <a:p>
+            <a:pPr lvl="1"/>
+            <a:r>
+              <a:rPr lang="en-US" dirty="0" smtClean="0"/>
+              <a:t>parser </a:t>
+            </a:r>
+            <a:r>
+              <a:rPr lang="en-US" dirty="0" smtClean="0"/>
+              <a:t>= </a:t>
             </a:r>
             <a:r>
               <a:rPr lang="en-US" dirty="0" err="1" smtClean="0"/>
-              <a:t>Albus</a:t>
-            </a:r>
-            <a:r>
-              <a:rPr lang="en-US" dirty="0" smtClean="0"/>
-              <a:t> Dumbledore? / Where is Hogwarts school located? </a:t>
-            </a:r>
+              <a:t>RegExpParser</a:t>
+            </a:r>
+            <a:r>
+              <a:rPr lang="en-US" dirty="0" smtClean="0"/>
+              <a:t>(</a:t>
+            </a:r>
+            <a:r>
+              <a:rPr lang="en-US" i="1" dirty="0" smtClean="0"/>
+              <a:t>grammar</a:t>
+            </a:r>
+            <a:r>
+              <a:rPr lang="en-US" dirty="0" smtClean="0"/>
+              <a:t>)</a:t>
+            </a:r>
+          </a:p>
+          <a:p>
+            <a:r>
+              <a:rPr lang="en-US" dirty="0" smtClean="0"/>
+              <a:t> Parsed query:</a:t>
+            </a:r>
+          </a:p>
+          <a:p>
+            <a:pPr lvl="1"/>
+            <a:r>
+              <a:rPr lang="en-US" dirty="0" err="1" smtClean="0"/>
+              <a:t>parser.parse</a:t>
+            </a:r>
+            <a:r>
+              <a:rPr lang="en-US" dirty="0" smtClean="0"/>
+              <a:t>(</a:t>
+            </a:r>
+            <a:r>
+              <a:rPr lang="en-US" i="1" dirty="0" err="1" smtClean="0"/>
+              <a:t>taggedInput</a:t>
+            </a:r>
+            <a:r>
+              <a:rPr lang="en-US" dirty="0" smtClean="0"/>
+              <a:t>) </a:t>
+            </a:r>
+          </a:p>
+          <a:p>
+            <a:pPr marL="457200" lvl="1" indent="0">
+              <a:buNone/>
+            </a:pPr>
             <a:endParaRPr lang="en-US" dirty="0"/>
           </a:p>
-          <a:p>
-            <a:pPr lvl="1"/>
-            <a:r>
-              <a:rPr lang="en-US" dirty="0" smtClean="0"/>
-              <a:t>&lt;WH-NP&gt; &lt;Aux&gt; &lt;NP&gt; and &lt;NP&gt; &lt;Aux&gt; &lt;WH-NP&gt;</a:t>
-            </a:r>
-          </a:p>
-          <a:p>
-            <a:pPr lvl="2"/>
-            <a:r>
-              <a:rPr lang="en-US" dirty="0" smtClean="0"/>
-              <a:t>Who is the love of Hermione’s life? /  </a:t>
-            </a:r>
-            <a:r>
-              <a:rPr lang="en-US" dirty="0"/>
-              <a:t>The spell  </a:t>
-            </a:r>
-            <a:r>
-              <a:rPr lang="en-US" dirty="0" err="1" smtClean="0"/>
-              <a:t>Wingardium</a:t>
-            </a:r>
-            <a:r>
-              <a:rPr lang="en-US" dirty="0" smtClean="0"/>
-              <a:t> </a:t>
-            </a:r>
-            <a:r>
-              <a:rPr lang="en-US" dirty="0" err="1" smtClean="0"/>
-              <a:t>Leviosa</a:t>
-            </a:r>
-            <a:r>
-              <a:rPr lang="en-US" smtClean="0"/>
-              <a:t> does </a:t>
-            </a:r>
-            <a:r>
-              <a:rPr lang="en-US" dirty="0" smtClean="0"/>
-              <a:t>what?</a:t>
-            </a:r>
-          </a:p>
-          <a:p>
-            <a:pPr lvl="1"/>
-            <a:r>
-              <a:rPr lang="en-US" dirty="0" smtClean="0"/>
-              <a:t>&lt;WH&gt; &lt;Aux&gt; &lt;NP&gt; &lt;VP&gt;</a:t>
-            </a:r>
-          </a:p>
-          <a:p>
-            <a:pPr lvl="2"/>
-            <a:r>
-              <a:rPr lang="en-US" dirty="0" smtClean="0"/>
-              <a:t>When did Bellatrix </a:t>
-            </a:r>
-            <a:r>
-              <a:rPr lang="en-US" dirty="0" err="1" smtClean="0"/>
-              <a:t>Lastrange</a:t>
-            </a:r>
-            <a:r>
-              <a:rPr lang="en-US" dirty="0" smtClean="0"/>
-              <a:t> escape from </a:t>
-            </a:r>
-            <a:r>
-              <a:rPr lang="en-US" dirty="0"/>
-              <a:t>A</a:t>
-            </a:r>
-            <a:r>
-              <a:rPr lang="en-US" dirty="0" smtClean="0"/>
-              <a:t>zkaban?</a:t>
-            </a:r>
-          </a:p>
-        </p:txBody>
-      </p:sp>
+        </p:txBody>
+      </p:sp>
+      <p:pic>
+        <p:nvPicPr>
+          <p:cNvPr id="2" name="Picture 1"/>
+          <p:cNvPicPr>
+            <a:picLocks noChangeAspect="1"/>
+          </p:cNvPicPr>
+          <p:nvPr/>
+        </p:nvPicPr>
+        <p:blipFill>
+          <a:blip r:embed="rId2"/>
+          <a:stretch>
+            <a:fillRect/>
+          </a:stretch>
+        </p:blipFill>
+        <p:spPr>
+          <a:xfrm>
+            <a:off x="6032064" y="4250026"/>
+            <a:ext cx="2195883" cy="1876137"/>
+          </a:xfrm>
+          <a:prstGeom prst="rect">
+            <a:avLst/>
+          </a:prstGeom>
+        </p:spPr>
+      </p:pic>
     </p:spTree>
     <p:extLst>
       <p:ext uri="{BB962C8B-B14F-4D97-AF65-F5344CB8AC3E}">
-        <p14:creationId xmlns:p14="http://schemas.microsoft.com/office/powerpoint/2010/main" val="1119770136"/>
+        <p14:creationId xmlns:p14="http://schemas.microsoft.com/office/powerpoint/2010/main" val="3825050236"/>
       </p:ext>
     </p:extLst>
   </p:cSld>
@@ -4078,7 +4080,7 @@
       </p:grpSpPr>
       <p:sp>
         <p:nvSpPr>
-          <p:cNvPr id="3" name="Title 2"/>
+          <p:cNvPr id="7" name="Title 6"/>
           <p:cNvSpPr>
             <a:spLocks noGrp="1"/>
           </p:cNvSpPr>
@@ -4092,101 +4094,219 @@
           <a:lstStyle/>
           <a:p>
             <a:r>
+              <a:rPr lang="en-US" dirty="0" smtClean="0"/>
+              <a:t>Understanding Queries</a:t>
+            </a:r>
+            <a:endParaRPr lang="en-US" dirty="0"/>
+          </a:p>
+        </p:txBody>
+      </p:sp>
+      <p:sp>
+        <p:nvSpPr>
+          <p:cNvPr id="8" name="Content Placeholder 7"/>
+          <p:cNvSpPr>
+            <a:spLocks noGrp="1"/>
+          </p:cNvSpPr>
+          <p:nvPr>
+            <p:ph idx="1"/>
+          </p:nvPr>
+        </p:nvSpPr>
+        <p:spPr/>
+        <p:txBody>
+          <a:bodyPr>
+            <a:normAutofit fontScale="62500" lnSpcReduction="20000"/>
+          </a:bodyPr>
+          <a:lstStyle/>
+          <a:p>
+            <a:r>
+              <a:rPr lang="en-US" dirty="0" smtClean="0"/>
+              <a:t>Strategy: </a:t>
+            </a:r>
+            <a:r>
+              <a:rPr lang="en-US" dirty="0" smtClean="0"/>
+              <a:t>Identify queries based </a:t>
+            </a:r>
+            <a:r>
+              <a:rPr lang="en-US" dirty="0" smtClean="0"/>
+              <a:t>on sentence </a:t>
+            </a:r>
+            <a:r>
+              <a:rPr lang="en-US" dirty="0" smtClean="0"/>
+              <a:t>structure </a:t>
+            </a:r>
+            <a:endParaRPr lang="en-US" dirty="0" smtClean="0"/>
+          </a:p>
+          <a:p>
+            <a:pPr marL="457200" lvl="1" indent="0">
+              <a:buNone/>
+            </a:pPr>
+            <a:r>
+              <a:rPr lang="en-US" dirty="0" smtClean="0"/>
+              <a:t>1. (S (</a:t>
+            </a:r>
+            <a:r>
+              <a:rPr lang="en-US" dirty="0" smtClean="0"/>
+              <a:t>WH</a:t>
+            </a:r>
+            <a:r>
+              <a:rPr lang="en-US" dirty="0" smtClean="0"/>
+              <a:t>-</a:t>
+            </a:r>
+            <a:r>
+              <a:rPr lang="en-US" dirty="0" smtClean="0"/>
+              <a:t>NP) (VP))</a:t>
+            </a:r>
+            <a:endParaRPr lang="en-US" dirty="0" smtClean="0"/>
+          </a:p>
+          <a:p>
+            <a:pPr lvl="2"/>
+            <a:r>
+              <a:rPr lang="en-US" dirty="0" smtClean="0"/>
+              <a:t>Who was </a:t>
+            </a:r>
+            <a:r>
               <a:rPr lang="en-US" dirty="0" err="1" smtClean="0"/>
-              <a:t>HermioneBot</a:t>
-            </a:r>
-            <a:r>
-              <a:rPr lang="en-US" dirty="0" smtClean="0"/>
-              <a:t> Algorithm</a:t>
+              <a:t>Albus</a:t>
+            </a:r>
+            <a:r>
+              <a:rPr lang="en-US" dirty="0" smtClean="0"/>
+              <a:t> Dumbledore? </a:t>
             </a:r>
             <a:endParaRPr lang="en-US" dirty="0"/>
           </a:p>
-        </p:txBody>
-      </p:sp>
-      <p:sp>
-        <p:nvSpPr>
-          <p:cNvPr id="4" name="Content Placeholder 3"/>
-          <p:cNvSpPr>
-            <a:spLocks noGrp="1"/>
-          </p:cNvSpPr>
-          <p:nvPr>
-            <p:ph idx="1"/>
-          </p:nvPr>
-        </p:nvSpPr>
-        <p:spPr/>
-        <p:txBody>
-          <a:bodyPr>
-            <a:normAutofit fontScale="70000" lnSpcReduction="20000"/>
-          </a:bodyPr>
-          <a:lstStyle/>
-          <a:p>
-            <a:pPr marL="514350" indent="-514350">
-              <a:buAutoNum type="arabicPeriod"/>
+          <a:p>
+            <a:pPr lvl="2"/>
+            <a:r>
+              <a:rPr lang="en-US" dirty="0" smtClean="0"/>
+              <a:t>Where </a:t>
+            </a:r>
+            <a:r>
+              <a:rPr lang="en-US" dirty="0" smtClean="0"/>
+              <a:t>is Hogwarts </a:t>
+            </a:r>
+            <a:r>
+              <a:rPr lang="en-US" dirty="0" smtClean="0"/>
+              <a:t>located?</a:t>
+            </a:r>
+          </a:p>
+          <a:p>
+            <a:pPr lvl="2"/>
+            <a:r>
+              <a:rPr lang="en-US" dirty="0"/>
+              <a:t>Who is the love of Hermione’s life? </a:t>
+            </a:r>
+            <a:r>
+              <a:rPr lang="en-US" dirty="0" smtClean="0"/>
+              <a:t> </a:t>
+            </a:r>
+          </a:p>
+          <a:p>
+            <a:pPr lvl="2"/>
+            <a:r>
+              <a:rPr lang="en-US" dirty="0"/>
+              <a:t>When did Bellatrix </a:t>
+            </a:r>
+            <a:r>
+              <a:rPr lang="en-US" dirty="0" err="1"/>
+              <a:t>Lastrange</a:t>
+            </a:r>
+            <a:r>
+              <a:rPr lang="en-US" dirty="0"/>
+              <a:t> escape from Azkaban</a:t>
+            </a:r>
+            <a:r>
+              <a:rPr lang="en-US" dirty="0" smtClean="0"/>
+              <a:t>?</a:t>
+            </a:r>
+            <a:endParaRPr lang="en-US" dirty="0"/>
+          </a:p>
+          <a:p>
+            <a:pPr marL="457200" lvl="1" indent="0">
+              <a:buNone/>
             </a:pPr>
             <a:r>
               <a:rPr lang="en-US" dirty="0" smtClean="0"/>
-              <a:t>Using </a:t>
+              <a:t>2. (S </a:t>
+            </a:r>
+            <a:r>
+              <a:rPr lang="en-US" dirty="0" smtClean="0"/>
+              <a:t>(</a:t>
+            </a:r>
+            <a:r>
+              <a:rPr lang="en-US" dirty="0" smtClean="0"/>
+              <a:t>NP) (VP … (WH-NP)))</a:t>
+            </a:r>
+            <a:endParaRPr lang="en-US" dirty="0" smtClean="0"/>
+          </a:p>
+          <a:p>
+            <a:pPr lvl="2"/>
+            <a:r>
+              <a:rPr lang="en-US" dirty="0" smtClean="0"/>
+              <a:t>The </a:t>
+            </a:r>
+            <a:r>
+              <a:rPr lang="en-US" dirty="0"/>
+              <a:t>spell  </a:t>
             </a:r>
             <a:r>
               <a:rPr lang="en-US" dirty="0" err="1" smtClean="0"/>
-              <a:t>Tkinter</a:t>
-            </a:r>
-            <a:r>
-              <a:rPr lang="en-US" dirty="0" smtClean="0"/>
-              <a:t>, the built-in python GUI package, generate text bubbles and prompt the user for their name.</a:t>
-            </a:r>
-          </a:p>
-          <a:p>
-            <a:pPr marL="514350" indent="-514350">
-              <a:buAutoNum type="arabicPeriod"/>
+              <a:t>Wingardium</a:t>
+            </a:r>
+            <a:r>
+              <a:rPr lang="en-US" dirty="0" smtClean="0"/>
+              <a:t> </a:t>
+            </a:r>
+            <a:r>
+              <a:rPr lang="en-US" dirty="0" err="1" smtClean="0"/>
+              <a:t>Leviosa</a:t>
+            </a:r>
+            <a:r>
+              <a:rPr lang="en-US" dirty="0" smtClean="0"/>
+              <a:t> does what</a:t>
+            </a:r>
+            <a:r>
+              <a:rPr lang="en-US" dirty="0" smtClean="0"/>
+              <a:t>?</a:t>
+            </a:r>
+          </a:p>
+          <a:p>
+            <a:pPr marL="457200" lvl="1" indent="0">
+              <a:buNone/>
             </a:pPr>
             <a:r>
               <a:rPr lang="en-US" dirty="0" smtClean="0"/>
-              <a:t>Store the user’s name and allow user to ask questions.</a:t>
-            </a:r>
-          </a:p>
-          <a:p>
-            <a:pPr marL="514350" indent="-514350">
-              <a:buAutoNum type="arabicPeriod"/>
-            </a:pPr>
-            <a:r>
-              <a:rPr lang="en-US" dirty="0" smtClean="0"/>
-              <a:t>On receiving input determine the user’s intent based on syntactical structure of input:</a:t>
-            </a:r>
-          </a:p>
-          <a:p>
-            <a:pPr marL="914400" lvl="1" indent="-514350"/>
-            <a:r>
-              <a:rPr lang="en-US" dirty="0" smtClean="0"/>
-              <a:t>Intents = {QUERY, STATEMENT, UNKNOWN}</a:t>
-            </a:r>
-          </a:p>
-          <a:p>
-            <a:pPr marL="914400" lvl="1" indent="-514350"/>
-            <a:r>
-              <a:rPr lang="en-US" dirty="0" smtClean="0"/>
-              <a:t>If  QUER Y or STATEMENT – determine S, V, O, search wiki comparing against word sequence similarity 	</a:t>
-            </a:r>
-          </a:p>
-          <a:p>
-            <a:pPr marL="914400" lvl="1" indent="-514350"/>
-            <a:r>
-              <a:rPr lang="en-US" dirty="0" smtClean="0"/>
-              <a:t>If UNKNOWN – return sassy quip, Hermione style</a:t>
-            </a:r>
-          </a:p>
-          <a:p>
-            <a:pPr marL="514350" indent="-514350">
-              <a:buAutoNum type="arabicPeriod"/>
-            </a:pPr>
-            <a:endParaRPr lang="en-US" dirty="0"/>
+              <a:t>3. (S (Aux) (NP) (VP| </a:t>
+            </a:r>
+            <a:r>
+              <a:rPr lang="en-US" dirty="0" err="1" smtClean="0"/>
+              <a:t>AdjP</a:t>
+            </a:r>
+            <a:r>
+              <a:rPr lang="en-US" dirty="0" smtClean="0"/>
+              <a:t>))</a:t>
+            </a:r>
+          </a:p>
+          <a:p>
+            <a:pPr lvl="2"/>
+            <a:r>
+              <a:rPr lang="en-US" dirty="0" smtClean="0"/>
+              <a:t> Does every spell require a wand?</a:t>
+            </a:r>
+          </a:p>
+          <a:p>
+            <a:pPr lvl="2"/>
+            <a:r>
+              <a:rPr lang="en-US" dirty="0" smtClean="0"/>
+              <a:t>Are you friends with Harry Potter?</a:t>
+            </a:r>
+            <a:endParaRPr lang="en-US" dirty="0" smtClean="0"/>
           </a:p>
         </p:txBody>
       </p:sp>
     </p:spTree>
     <p:extLst>
       <p:ext uri="{BB962C8B-B14F-4D97-AF65-F5344CB8AC3E}">
-        <p14:creationId xmlns:p14="http://schemas.microsoft.com/office/powerpoint/2010/main" val="1480177961"/>
+        <p14:creationId xmlns:p14="http://schemas.microsoft.com/office/powerpoint/2010/main" val="92564973"/>
       </p:ext>
     </p:extLst>
   </p:cSld>
@@ -4222,7 +4342,7 @@
       </p:grpSpPr>
       <p:sp>
         <p:nvSpPr>
-          <p:cNvPr id="2" name="Title 1"/>
+          <p:cNvPr id="3" name="Title 2"/>
           <p:cNvSpPr>
             <a:spLocks noGrp="1"/>
           </p:cNvSpPr>
@@ -4236,8 +4356,12 @@
           <a:lstStyle/>
           <a:p>
             <a:r>
-              <a:rPr lang="en-US" dirty="0" smtClean="0"/>
-              <a:t>Spell Checking</a:t>
+              <a:rPr lang="en-US" dirty="0" err="1" smtClean="0"/>
+              <a:t>HermioneBot</a:t>
+            </a:r>
+            <a:r>
+              <a:rPr lang="en-US" dirty="0" smtClean="0"/>
+              <a:t> Algorithm</a:t>
             </a:r>
             <a:endParaRPr lang="en-US" dirty="0"/>
           </a:p>
@@ -4245,7 +4369,7 @@
       </p:sp>
       <p:sp>
         <p:nvSpPr>
-          <p:cNvPr id="3" name="Content Placeholder 2"/>
+          <p:cNvPr id="4" name="Content Placeholder 3"/>
           <p:cNvSpPr>
             <a:spLocks noGrp="1"/>
           </p:cNvSpPr>
@@ -4256,13 +4380,91 @@
         <p:spPr/>
         <p:txBody>
           <a:bodyPr>
-            <a:normAutofit fontScale="85000" lnSpcReduction="10000"/>
+            <a:normAutofit fontScale="55000" lnSpcReduction="20000"/>
           </a:bodyPr>
           <a:lstStyle/>
           <a:p>
-            <a:r>
-              <a:rPr lang="en-US" dirty="0" smtClean="0"/>
-              <a:t>If no matching article found on </a:t>
+            <a:pPr marL="514350" indent="-514350">
+              <a:buAutoNum type="arabicPeriod"/>
+            </a:pPr>
+            <a:r>
+              <a:rPr lang="en-US" dirty="0" smtClean="0"/>
+              <a:t>Using </a:t>
+            </a:r>
+            <a:r>
+              <a:rPr lang="en-US" dirty="0" err="1" smtClean="0"/>
+              <a:t>Tkinter</a:t>
+            </a:r>
+            <a:r>
+              <a:rPr lang="en-US" dirty="0" smtClean="0"/>
+              <a:t>, the built-in python GUI package, generate text bubbles and prompt the user for their name.</a:t>
+            </a:r>
+          </a:p>
+          <a:p>
+            <a:pPr marL="514350" indent="-514350">
+              <a:buAutoNum type="arabicPeriod"/>
+            </a:pPr>
+            <a:r>
+              <a:rPr lang="en-US" dirty="0" smtClean="0"/>
+              <a:t>Store the user’s name and allow user to ask questions.</a:t>
+            </a:r>
+          </a:p>
+          <a:p>
+            <a:pPr marL="514350" indent="-514350">
+              <a:buAutoNum type="arabicPeriod"/>
+            </a:pPr>
+            <a:r>
+              <a:rPr lang="en-US" dirty="0" smtClean="0"/>
+              <a:t>On receiving input determine the user’s intent based on </a:t>
+            </a:r>
+            <a:r>
+              <a:rPr lang="en-US" dirty="0" smtClean="0"/>
+              <a:t>syntactic structure </a:t>
+            </a:r>
+            <a:r>
+              <a:rPr lang="en-US" dirty="0" smtClean="0"/>
+              <a:t>of input:</a:t>
+            </a:r>
+          </a:p>
+          <a:p>
+            <a:pPr marL="914400" lvl="1" indent="-514350"/>
+            <a:r>
+              <a:rPr lang="en-US" dirty="0" smtClean="0"/>
+              <a:t>Intents = {QUERY, UNKNOWN}</a:t>
+            </a:r>
+          </a:p>
+          <a:p>
+            <a:pPr marL="914400" lvl="1" indent="-514350"/>
+            <a:r>
+              <a:rPr lang="en-US" dirty="0" smtClean="0"/>
+              <a:t>If  QUER </a:t>
+            </a:r>
+            <a:r>
+              <a:rPr lang="en-US" dirty="0" smtClean="0"/>
+              <a:t>Y:</a:t>
+            </a:r>
+          </a:p>
+          <a:p>
+            <a:pPr marL="1314450" lvl="2" indent="-514350"/>
+            <a:r>
+              <a:rPr lang="en-US" dirty="0" smtClean="0"/>
+              <a:t>Perform spell check, if spelling error detected return suggestion</a:t>
+            </a:r>
+            <a:endParaRPr lang="en-US" dirty="0"/>
+          </a:p>
+          <a:p>
+            <a:pPr marL="1314450" lvl="2" indent="-514350"/>
+            <a:r>
+              <a:rPr lang="en-US" dirty="0" smtClean="0"/>
+              <a:t>Given parse, select primary queries (simplified NP) and additional keywords (verbs) </a:t>
+            </a:r>
+            <a:endParaRPr lang="en-US" dirty="0" smtClean="0"/>
+          </a:p>
+          <a:p>
+            <a:pPr marL="1314450" lvl="2" indent="-514350"/>
+            <a:r>
+              <a:rPr lang="en-US" dirty="0" smtClean="0"/>
+              <a:t>Query </a:t>
             </a:r>
             <a:r>
               <a:rPr lang="en-US" dirty="0" err="1" smtClean="0"/>
@@ -4270,85 +4472,63 @@
             </a:r>
             <a:r>
               <a:rPr lang="en-US" dirty="0" smtClean="0"/>
-              <a:t> perform spell check</a:t>
-            </a:r>
-          </a:p>
-          <a:p>
-            <a:r>
-              <a:rPr lang="en-US" dirty="0" smtClean="0"/>
-              <a:t>Calculate edit-distance against pre-defined vocabulary</a:t>
-            </a:r>
-          </a:p>
-          <a:p>
-            <a:pPr lvl="1"/>
-            <a:r>
-              <a:rPr lang="en-US" dirty="0" smtClean="0"/>
-              <a:t>Vocab consists of spells, characters, etc. (domain-specific)</a:t>
-            </a:r>
-          </a:p>
-          <a:p>
-            <a:pPr lvl="1"/>
-            <a:r>
-              <a:rPr lang="en-US" dirty="0" smtClean="0"/>
-              <a:t>Uses </a:t>
-            </a:r>
-            <a:r>
-              <a:rPr lang="en-US" i="1" dirty="0" smtClean="0"/>
-              <a:t>split</a:t>
-            </a:r>
-            <a:r>
-              <a:rPr lang="en-US" dirty="0" smtClean="0"/>
-              <a:t>, </a:t>
-            </a:r>
-            <a:r>
-              <a:rPr lang="en-US" i="1" dirty="0" smtClean="0"/>
-              <a:t>insert</a:t>
-            </a:r>
-            <a:r>
-              <a:rPr lang="en-US" dirty="0" smtClean="0"/>
-              <a:t>, </a:t>
-            </a:r>
-            <a:r>
-              <a:rPr lang="en-US" i="1" dirty="0" smtClean="0"/>
-              <a:t>replace</a:t>
-            </a:r>
-            <a:r>
-              <a:rPr lang="en-US" dirty="0" smtClean="0"/>
-              <a:t>, </a:t>
-            </a:r>
-            <a:r>
-              <a:rPr lang="en-US" i="1" dirty="0" smtClean="0"/>
-              <a:t>transpose</a:t>
-            </a:r>
-            <a:r>
-              <a:rPr lang="en-US" dirty="0" smtClean="0"/>
-              <a:t> &amp; </a:t>
-            </a:r>
-            <a:r>
-              <a:rPr lang="en-US" i="1" dirty="0" smtClean="0"/>
-              <a:t>delete</a:t>
-            </a:r>
-          </a:p>
-          <a:p>
-            <a:pPr lvl="1"/>
-            <a:r>
-              <a:rPr lang="en-US" dirty="0" smtClean="0"/>
-              <a:t> if min edit-distance &lt; x, return suggestion</a:t>
-            </a:r>
-            <a:endParaRPr lang="en-US" dirty="0"/>
+              <a:t> for articles relating to queries</a:t>
+            </a:r>
+          </a:p>
+          <a:p>
+            <a:pPr marL="1314450" lvl="2" indent="-514350"/>
+            <a:r>
+              <a:rPr lang="en-US" dirty="0" smtClean="0"/>
+              <a:t>Iterate through article text predicting relevance given queries and keywords</a:t>
+            </a:r>
+          </a:p>
+          <a:p>
+            <a:pPr marL="1314450" lvl="2" indent="-514350"/>
+            <a:r>
+              <a:rPr lang="en-US" dirty="0" smtClean="0"/>
+              <a:t>Return most relevant 1 – 2 sentences </a:t>
+            </a:r>
+            <a:endParaRPr lang="en-US" dirty="0" smtClean="0"/>
+          </a:p>
+          <a:p>
+            <a:pPr marL="914400" lvl="1" indent="-514350"/>
+            <a:r>
+              <a:rPr lang="en-US" dirty="0" smtClean="0"/>
+              <a:t>If </a:t>
+            </a:r>
+            <a:r>
+              <a:rPr lang="en-US" dirty="0" smtClean="0"/>
+              <a:t>UNKNOWN or empty </a:t>
+            </a:r>
+            <a:r>
+              <a:rPr lang="en-US" dirty="0" smtClean="0"/>
+              <a:t>– return sassy quip, Hermione </a:t>
+            </a:r>
+            <a:r>
+              <a:rPr lang="en-US" dirty="0" smtClean="0"/>
+              <a:t>style</a:t>
+            </a:r>
+            <a:endParaRPr lang="en-US" dirty="0" smtClean="0"/>
           </a:p>
         </p:txBody>
       </p:sp>
     </p:spTree>
     <p:extLst>
       <p:ext uri="{BB962C8B-B14F-4D97-AF65-F5344CB8AC3E}">
-        <p14:creationId xmlns:p14="http://schemas.microsoft.com/office/powerpoint/2010/main" val="2916702860"/>
+        <p14:creationId xmlns:p14="http://schemas.microsoft.com/office/powerpoint/2010/main" val="3281949417"/>
       </p:ext>
     </p:extLst>
   </p:cSld>
   <p:clrMapOvr>
     <a:masterClrMapping/>
   </p:clrMapOvr>
+  <p:timing>
+    <p:tnLst>
+      <p:par>
+        <p:cTn xmlns:p14="http://schemas.microsoft.com/office/powerpoint/2010/main" id="1" dur="indefinite" restart="never" nodeType="tmRoot"/>
+      </p:par>
+    </p:tnLst>
+  </p:timing>
 </p:sld>
 </file>
 
@@ -4371,7 +4551,7 @@
       </p:grpSpPr>
       <p:sp>
         <p:nvSpPr>
-          <p:cNvPr id="6" name="Title 5"/>
+          <p:cNvPr id="2" name="Title 1"/>
           <p:cNvSpPr>
             <a:spLocks noGrp="1"/>
           </p:cNvSpPr>
@@ -4379,36 +4559,140 @@
             <p:ph type="title"/>
           </p:nvPr>
         </p:nvSpPr>
-        <p:spPr>
-          <a:xfrm>
-            <a:off x="457200" y="2626365"/>
-            <a:ext cx="8229600" cy="1143000"/>
-          </a:xfrm>
-        </p:spPr>
+        <p:spPr/>
+        <p:txBody>
+          <a:bodyPr/>
+          <a:lstStyle/>
+          <a:p>
+            <a:r>
+              <a:rPr lang="en-US" dirty="0" smtClean="0"/>
+              <a:t>Spell Checking</a:t>
+            </a:r>
+            <a:endParaRPr lang="en-US" dirty="0"/>
+          </a:p>
+        </p:txBody>
+      </p:sp>
+      <p:sp>
+        <p:nvSpPr>
+          <p:cNvPr id="3" name="Content Placeholder 2"/>
+          <p:cNvSpPr>
+            <a:spLocks noGrp="1"/>
+          </p:cNvSpPr>
+          <p:nvPr>
+            <p:ph idx="1"/>
+          </p:nvPr>
+        </p:nvSpPr>
+        <p:spPr/>
         <p:txBody>
           <a:bodyPr>
-            <a:noAutofit/>
+            <a:normAutofit fontScale="85000" lnSpcReduction="10000"/>
           </a:bodyPr>
           <a:lstStyle/>
           <a:p>
             <a:r>
-              <a:rPr lang="en-US" sz="8000" dirty="0" smtClean="0"/>
-              <a:t>Demo!</a:t>
-            </a:r>
-            <a:endParaRPr lang="en-US" sz="8000" dirty="0"/>
+              <a:rPr lang="en-US" dirty="0" smtClean="0"/>
+              <a:t>Before searching &amp; scanning articles on </a:t>
+            </a:r>
+            <a:r>
+              <a:rPr lang="en-US" dirty="0" err="1" smtClean="0"/>
+              <a:t>wikia</a:t>
+            </a:r>
+            <a:r>
+              <a:rPr lang="en-US" dirty="0" smtClean="0"/>
+              <a:t> </a:t>
+            </a:r>
+            <a:r>
+              <a:rPr lang="en-US" dirty="0" smtClean="0"/>
+              <a:t>perform </a:t>
+            </a:r>
+            <a:r>
+              <a:rPr lang="en-US" dirty="0" smtClean="0"/>
+              <a:t>spell check</a:t>
+            </a:r>
+          </a:p>
+          <a:p>
+            <a:r>
+              <a:rPr lang="en-US" dirty="0" smtClean="0"/>
+              <a:t>Calculate edit-distance against pre-defined vocabulary</a:t>
+            </a:r>
+          </a:p>
+          <a:p>
+            <a:pPr lvl="1"/>
+            <a:r>
+              <a:rPr lang="en-US" dirty="0" smtClean="0"/>
+              <a:t>Vocab consists of spells, characters, etc. (domain-specific)</a:t>
+            </a:r>
+          </a:p>
+          <a:p>
+            <a:pPr lvl="1"/>
+            <a:r>
+              <a:rPr lang="en-US" dirty="0" smtClean="0"/>
+              <a:t>Uses </a:t>
+            </a:r>
+            <a:r>
+              <a:rPr lang="en-US" i="1" dirty="0" smtClean="0"/>
+              <a:t>insert</a:t>
+            </a:r>
+            <a:r>
+              <a:rPr lang="en-US" dirty="0" smtClean="0"/>
+              <a:t>, </a:t>
+            </a:r>
+            <a:r>
+              <a:rPr lang="en-US" i="1" dirty="0" smtClean="0"/>
+              <a:t>replace</a:t>
+            </a:r>
+            <a:r>
+              <a:rPr lang="en-US" dirty="0" smtClean="0"/>
+              <a:t>, </a:t>
+            </a:r>
+            <a:r>
+              <a:rPr lang="en-US" i="1" dirty="0" smtClean="0"/>
+              <a:t>transpose</a:t>
+            </a:r>
+            <a:r>
+              <a:rPr lang="en-US" dirty="0" smtClean="0"/>
+              <a:t> &amp; </a:t>
+            </a:r>
+            <a:r>
+              <a:rPr lang="en-US" i="1" dirty="0" smtClean="0"/>
+              <a:t>delete</a:t>
+            </a:r>
+          </a:p>
+          <a:p>
+            <a:pPr lvl="1"/>
+            <a:r>
+              <a:rPr lang="en-US" dirty="0" smtClean="0"/>
+              <a:t> if min edit-</a:t>
+            </a:r>
+            <a:r>
+              <a:rPr lang="en-US" dirty="0" smtClean="0"/>
+              <a:t>distance &lt; length(word) , </a:t>
+            </a:r>
+            <a:r>
+              <a:rPr lang="en-US" dirty="0" smtClean="0"/>
+              <a:t>return suggestion</a:t>
+            </a:r>
+            <a:endParaRPr lang="en-US" dirty="0"/>
           </a:p>
         </p:txBody>
       </p:sp>
     </p:spTree>
     <p:extLst>
       <p:ext uri="{BB962C8B-B14F-4D97-AF65-F5344CB8AC3E}">
-        <p14:creationId xmlns:p14="http://schemas.microsoft.com/office/powerpoint/2010/main" val="3080268509"/>
+        <p14:creationId xmlns:p14="http://schemas.microsoft.com/office/powerpoint/2010/main" val="2916702860"/>
       </p:ext>
     </p:extLst>
   </p:cSld>
   <p:clrMapOvr>
     <a:masterClrMapping/>
   </p:clrMapOvr>
+  <p:timing>
+    <p:tnLst>
+      <p:par>
+        <p:cTn xmlns:p14="http://schemas.microsoft.com/office/powerpoint/2010/main" id="1" dur="indefinite" restart="never" nodeType="tmRoot"/>
+      </p:par>
+    </p:tnLst>
+  </p:timing>
 </p:sld>
 </file>
 

</xml_diff>